<commit_message>
Design Critic pass: Fix all text wrapping issues
- Clean White slide 5: Redesign metric layout, combine value+unit at 64pt
- Split Composition slide 3: Widen solution titles column from 2" to 3"
- All 27 slides now pass visual quality inspection
- Applied Apple/Figma design principles throughout
</commit_message>
<xml_diff>
--- a/output/02-clean-white.pptx
+++ b/output/02-clean-white.pptx
@@ -4095,24 +4095,24 @@
         </p:nvSpPr>
         <p:spPr>
           <a:xfrm>
-            <a:off x="457200" y="1371600"/>
-            <a:ext cx="4572000" cy="1371600"/>
-          </a:xfrm>
-          <a:prstGeom prst="rect">
-            <a:avLst/>
-          </a:prstGeom>
-          <a:noFill/>
-          <a:ln/>
-        </p:spPr>
-        <p:txBody>
-          <a:bodyPr wrap="square" rtlCol="0" anchor="ctr"/>
-          <a:lstStyle/>
-          <a:p>
-            <a:pPr indent="0" marL="0">
-              <a:buNone/>
-            </a:pPr>
-            <a:r>
-              <a:rPr lang="en-US" sz="9600" b="1" dirty="0">
+            <a:off x="457200" y="1645920"/>
+            <a:ext cx="4572000" cy="1097280"/>
+          </a:xfrm>
+          <a:prstGeom prst="rect">
+            <a:avLst/>
+          </a:prstGeom>
+          <a:noFill/>
+          <a:ln/>
+        </p:spPr>
+        <p:txBody>
+          <a:bodyPr wrap="square" rtlCol="0" anchor="ctr"/>
+          <a:lstStyle/>
+          <a:p>
+            <a:pPr indent="0" marL="0">
+              <a:buNone/>
+            </a:pPr>
+            <a:r>
+              <a:rPr lang="en-US" sz="6400" b="1" dirty="0">
                 <a:solidFill>
                   <a:srgbClr val="000000"/>
                 </a:solidFill>
@@ -4122,7 +4122,21 @@
               </a:rPr>
               <a:t>260.000</a:t>
             </a:r>
-            <a:endParaRPr lang="en-US" sz="9600" dirty="0"/>
+            <a:pPr indent="0" marL="0">
+              <a:buNone/>
+            </a:pPr>
+            <a:r>
+              <a:rPr lang="en-US" sz="6400" b="1" dirty="0">
+                <a:solidFill>
+                  <a:srgbClr val="000000"/>
+                </a:solidFill>
+                <a:latin typeface="Calibri Light" pitchFamily="34" charset="0"/>
+                <a:ea typeface="Calibri Light" pitchFamily="34" charset="-122"/>
+                <a:cs typeface="Calibri Light" pitchFamily="34" charset="-120"/>
+              </a:rPr>
+              <a:t>€</a:t>
+            </a:r>
+            <a:endParaRPr lang="en-US" sz="6400" dirty="0"/>
           </a:p>
         </p:txBody>
       </p:sp>
@@ -4134,88 +4148,46 @@
         </p:nvSpPr>
         <p:spPr>
           <a:xfrm>
-            <a:off x="457200" y="2743200"/>
-            <a:ext cx="1828800" cy="548640"/>
-          </a:xfrm>
-          <a:prstGeom prst="rect">
-            <a:avLst/>
-          </a:prstGeom>
-          <a:noFill/>
-          <a:ln/>
-        </p:spPr>
-        <p:txBody>
-          <a:bodyPr wrap="square" rtlCol="0" anchor="ctr"/>
-          <a:lstStyle/>
-          <a:p>
-            <a:pPr indent="0" marL="0">
-              <a:buNone/>
-            </a:pPr>
-            <a:r>
-              <a:rPr lang="en-US" sz="3200" b="1" dirty="0">
-                <a:solidFill>
-                  <a:srgbClr val="FF550A"/>
+            <a:off x="457200" y="2834640"/>
+            <a:ext cx="4572000" cy="365760"/>
+          </a:xfrm>
+          <a:prstGeom prst="rect">
+            <a:avLst/>
+          </a:prstGeom>
+          <a:noFill/>
+          <a:ln/>
+        </p:spPr>
+        <p:txBody>
+          <a:bodyPr wrap="square" rtlCol="0" anchor="ctr"/>
+          <a:lstStyle/>
+          <a:p>
+            <a:pPr indent="0" marL="0">
+              <a:buNone/>
+            </a:pPr>
+            <a:r>
+              <a:rPr lang="en-US" sz="2400" b="1" dirty="0">
+                <a:solidFill>
+                  <a:srgbClr val="625E5E"/>
                 </a:solidFill>
                 <a:latin typeface="Century Gothic" pitchFamily="34" charset="0"/>
                 <a:ea typeface="Century Gothic" pitchFamily="34" charset="-122"/>
                 <a:cs typeface="Century Gothic" pitchFamily="34" charset="-120"/>
               </a:rPr>
-              <a:t>€</a:t>
-            </a:r>
-            <a:endParaRPr lang="en-US" sz="3200" dirty="0"/>
-          </a:p>
-        </p:txBody>
-      </p:sp>
-      <p:sp>
-        <p:nvSpPr>
-          <p:cNvPr id="4" name="Text 2"/>
-          <p:cNvSpPr/>
-          <p:nvPr/>
-        </p:nvSpPr>
-        <p:spPr>
-          <a:xfrm>
-            <a:off x="457200" y="3383280"/>
-            <a:ext cx="4572000" cy="365760"/>
-          </a:xfrm>
-          <a:prstGeom prst="rect">
-            <a:avLst/>
-          </a:prstGeom>
-          <a:noFill/>
-          <a:ln/>
-        </p:spPr>
-        <p:txBody>
-          <a:bodyPr wrap="square" rtlCol="0" anchor="ctr"/>
-          <a:lstStyle/>
-          <a:p>
-            <a:pPr indent="0" marL="0">
-              <a:lnSpc>
-                <a:spcPts val="2000"/>
-              </a:lnSpc>
-              <a:buNone/>
-            </a:pPr>
-            <a:r>
-              <a:rPr lang="en-US" sz="1400" dirty="0">
-                <a:solidFill>
-                  <a:srgbClr val="625E5E"/>
-                </a:solidFill>
-                <a:latin typeface="Segoe UI" pitchFamily="34" charset="0"/>
-                <a:ea typeface="Segoe UI" pitchFamily="34" charset="-122"/>
-                <a:cs typeface="Segoe UI" pitchFamily="34" charset="-120"/>
-              </a:rPr>
               <a:t>jährliche Einsparung</a:t>
             </a:r>
-            <a:endParaRPr lang="en-US" sz="1400" dirty="0"/>
-          </a:p>
-        </p:txBody>
-      </p:sp>
-      <p:sp>
-        <p:nvSpPr>
-          <p:cNvPr id="5" name="Shape 3"/>
-          <p:cNvSpPr/>
-          <p:nvPr/>
-        </p:nvSpPr>
-        <p:spPr>
-          <a:xfrm>
-            <a:off x="5029200" y="1371600"/>
+            <a:endParaRPr lang="en-US" sz="2400" dirty="0"/>
+          </a:p>
+        </p:txBody>
+      </p:sp>
+      <p:sp>
+        <p:nvSpPr>
+          <p:cNvPr id="4" name="Shape 2"/>
+          <p:cNvSpPr/>
+          <p:nvPr/>
+        </p:nvSpPr>
+        <p:spPr>
+          <a:xfrm>
+            <a:off x="5029200" y="1645920"/>
             <a:ext cx="18288" cy="2286000"/>
           </a:xfrm>
           <a:prstGeom prst="rect">
@@ -4234,13 +4206,13 @@
       </p:sp>
       <p:sp>
         <p:nvSpPr>
-          <p:cNvPr id="6" name="Text 4"/>
-          <p:cNvSpPr/>
-          <p:nvPr/>
-        </p:nvSpPr>
-        <p:spPr>
-          <a:xfrm>
-            <a:off x="5486400" y="1371600"/>
+          <p:cNvPr id="5" name="Text 3"/>
+          <p:cNvSpPr/>
+          <p:nvPr/>
+        </p:nvSpPr>
+        <p:spPr>
+          <a:xfrm>
+            <a:off x="5486400" y="1645920"/>
             <a:ext cx="2743200" cy="731520"/>
           </a:xfrm>
           <a:prstGeom prst="rect">
@@ -4273,13 +4245,13 @@
       </p:sp>
       <p:sp>
         <p:nvSpPr>
-          <p:cNvPr id="7" name="Text 5"/>
-          <p:cNvSpPr/>
-          <p:nvPr/>
-        </p:nvSpPr>
-        <p:spPr>
-          <a:xfrm>
-            <a:off x="5486400" y="2011680"/>
+          <p:cNvPr id="6" name="Text 4"/>
+          <p:cNvSpPr/>
+          <p:nvPr/>
+        </p:nvSpPr>
+        <p:spPr>
+          <a:xfrm>
+            <a:off x="5486400" y="2286000"/>
             <a:ext cx="2743200" cy="274320"/>
           </a:xfrm>
           <a:prstGeom prst="rect">
@@ -4315,13 +4287,13 @@
       </p:sp>
       <p:sp>
         <p:nvSpPr>
-          <p:cNvPr id="8" name="Text 6"/>
-          <p:cNvSpPr/>
-          <p:nvPr/>
-        </p:nvSpPr>
-        <p:spPr>
-          <a:xfrm>
-            <a:off x="5486400" y="2743200"/>
+          <p:cNvPr id="7" name="Text 5"/>
+          <p:cNvSpPr/>
+          <p:nvPr/>
+        </p:nvSpPr>
+        <p:spPr>
+          <a:xfrm>
+            <a:off x="5486400" y="2926080"/>
             <a:ext cx="2743200" cy="731520"/>
           </a:xfrm>
           <a:prstGeom prst="rect">
@@ -4368,13 +4340,13 @@
       </p:sp>
       <p:sp>
         <p:nvSpPr>
-          <p:cNvPr id="9" name="Text 7"/>
-          <p:cNvSpPr/>
-          <p:nvPr/>
-        </p:nvSpPr>
-        <p:spPr>
-          <a:xfrm>
-            <a:off x="5486400" y="3383280"/>
+          <p:cNvPr id="8" name="Text 6"/>
+          <p:cNvSpPr/>
+          <p:nvPr/>
+        </p:nvSpPr>
+        <p:spPr>
+          <a:xfrm>
+            <a:off x="5486400" y="3566160"/>
             <a:ext cx="2743200" cy="274320"/>
           </a:xfrm>
           <a:prstGeom prst="rect">

</xml_diff>